<commit_message>
docs/adam: added pilot for new tv show
modified my posters and flowchart
</commit_message>
<xml_diff>
--- a/docs/adam/eBPFPoster.pptx
+++ b/docs/adam/eBPFPoster.pptx
@@ -104,6 +104,11 @@
       </a:defRPr>
     </a:lvl9pPr>
   </p:defaultTextStyle>
+  <p:extLst>
+    <p:ext uri="{EFAFB233-063F-42B5-8137-9DF3F51BA10A}">
+      <p15:sldGuideLst xmlns:p15="http://schemas.microsoft.com/office/powerpoint/2012/main"/>
+    </p:ext>
+  </p:extLst>
 </p:presentation>
 </file>
 
@@ -254,7 +259,7 @@
           <a:p>
             <a:fld id="{58E6E6F5-55F3-4C2D-AF33-FEDFEABAD336}" type="datetimeFigureOut">
               <a:rPr lang="en-US" smtClean="0"/>
-              <a:t>3/1/2023</a:t>
+              <a:t>3/1/23</a:t>
             </a:fld>
             <a:endParaRPr lang="en-US"/>
           </a:p>
@@ -452,7 +457,7 @@
           <a:p>
             <a:fld id="{58E6E6F5-55F3-4C2D-AF33-FEDFEABAD336}" type="datetimeFigureOut">
               <a:rPr lang="en-US" smtClean="0"/>
-              <a:t>3/1/2023</a:t>
+              <a:t>3/1/23</a:t>
             </a:fld>
             <a:endParaRPr lang="en-US"/>
           </a:p>
@@ -660,7 +665,7 @@
           <a:p>
             <a:fld id="{58E6E6F5-55F3-4C2D-AF33-FEDFEABAD336}" type="datetimeFigureOut">
               <a:rPr lang="en-US" smtClean="0"/>
-              <a:t>3/1/2023</a:t>
+              <a:t>3/1/23</a:t>
             </a:fld>
             <a:endParaRPr lang="en-US"/>
           </a:p>
@@ -858,7 +863,7 @@
           <a:p>
             <a:fld id="{58E6E6F5-55F3-4C2D-AF33-FEDFEABAD336}" type="datetimeFigureOut">
               <a:rPr lang="en-US" smtClean="0"/>
-              <a:t>3/1/2023</a:t>
+              <a:t>3/1/23</a:t>
             </a:fld>
             <a:endParaRPr lang="en-US"/>
           </a:p>
@@ -1133,7 +1138,7 @@
           <a:p>
             <a:fld id="{58E6E6F5-55F3-4C2D-AF33-FEDFEABAD336}" type="datetimeFigureOut">
               <a:rPr lang="en-US" smtClean="0"/>
-              <a:t>3/1/2023</a:t>
+              <a:t>3/1/23</a:t>
             </a:fld>
             <a:endParaRPr lang="en-US"/>
           </a:p>
@@ -1398,7 +1403,7 @@
           <a:p>
             <a:fld id="{58E6E6F5-55F3-4C2D-AF33-FEDFEABAD336}" type="datetimeFigureOut">
               <a:rPr lang="en-US" smtClean="0"/>
-              <a:t>3/1/2023</a:t>
+              <a:t>3/1/23</a:t>
             </a:fld>
             <a:endParaRPr lang="en-US"/>
           </a:p>
@@ -1810,7 +1815,7 @@
           <a:p>
             <a:fld id="{58E6E6F5-55F3-4C2D-AF33-FEDFEABAD336}" type="datetimeFigureOut">
               <a:rPr lang="en-US" smtClean="0"/>
-              <a:t>3/1/2023</a:t>
+              <a:t>3/1/23</a:t>
             </a:fld>
             <a:endParaRPr lang="en-US"/>
           </a:p>
@@ -1951,7 +1956,7 @@
           <a:p>
             <a:fld id="{58E6E6F5-55F3-4C2D-AF33-FEDFEABAD336}" type="datetimeFigureOut">
               <a:rPr lang="en-US" smtClean="0"/>
-              <a:t>3/1/2023</a:t>
+              <a:t>3/1/23</a:t>
             </a:fld>
             <a:endParaRPr lang="en-US"/>
           </a:p>
@@ -2064,7 +2069,7 @@
           <a:p>
             <a:fld id="{58E6E6F5-55F3-4C2D-AF33-FEDFEABAD336}" type="datetimeFigureOut">
               <a:rPr lang="en-US" smtClean="0"/>
-              <a:t>3/1/2023</a:t>
+              <a:t>3/1/23</a:t>
             </a:fld>
             <a:endParaRPr lang="en-US"/>
           </a:p>
@@ -2375,7 +2380,7 @@
           <a:p>
             <a:fld id="{58E6E6F5-55F3-4C2D-AF33-FEDFEABAD336}" type="datetimeFigureOut">
               <a:rPr lang="en-US" smtClean="0"/>
-              <a:t>3/1/2023</a:t>
+              <a:t>3/1/23</a:t>
             </a:fld>
             <a:endParaRPr lang="en-US"/>
           </a:p>
@@ -2663,7 +2668,7 @@
           <a:p>
             <a:fld id="{58E6E6F5-55F3-4C2D-AF33-FEDFEABAD336}" type="datetimeFigureOut">
               <a:rPr lang="en-US" smtClean="0"/>
-              <a:t>3/1/2023</a:t>
+              <a:t>3/1/23</a:t>
             </a:fld>
             <a:endParaRPr lang="en-US"/>
           </a:p>
@@ -2904,7 +2909,7 @@
           <a:p>
             <a:fld id="{58E6E6F5-55F3-4C2D-AF33-FEDFEABAD336}" type="datetimeFigureOut">
               <a:rPr lang="en-US" smtClean="0"/>
-              <a:t>3/1/2023</a:t>
+              <a:t>3/1/23</a:t>
             </a:fld>
             <a:endParaRPr lang="en-US"/>
           </a:p>
@@ -3391,7 +3396,7 @@
         <p:spPr>
           <a:xfrm>
             <a:off x="615546" y="1837291"/>
-            <a:ext cx="3197256" cy="2031325"/>
+            <a:ext cx="3197256" cy="2462213"/>
           </a:xfrm>
           <a:prstGeom prst="rect">
             <a:avLst/>
@@ -3449,6 +3454,16 @@
             <a:r>
               <a:rPr lang="en-US" sz="1400" dirty="0"/>
               <a:t>Lack of a rigid testing framework for the verifier</a:t>
+            </a:r>
+          </a:p>
+          <a:p>
+            <a:pPr marL="285750" indent="-182880">
+              <a:buFont typeface="Arial" panose="020B0604020202020204" pitchFamily="34" charset="0"/>
+              <a:buChar char="•"/>
+            </a:pPr>
+            <a:r>
+              <a:rPr lang="en-US" sz="1400" dirty="0"/>
+              <a:t>Verification is slow on embedded devices</a:t>
             </a:r>
           </a:p>
           <a:p>
@@ -3663,110 +3678,6 @@
               <a:buChar char="•"/>
             </a:pPr>
             <a:endParaRPr lang="en-US" sz="1400" dirty="0"/>
-          </a:p>
-          <a:p>
-            <a:pPr marL="285750" indent="-285750">
-              <a:buFont typeface="Arial" panose="020B0604020202020204" pitchFamily="34" charset="0"/>
-              <a:buChar char="•"/>
-            </a:pPr>
-            <a:endParaRPr lang="en-US" sz="1400" dirty="0"/>
-          </a:p>
-        </p:txBody>
-      </p:sp>
-      <p:sp>
-        <p:nvSpPr>
-          <p:cNvPr id="10" name="TextBox 9">
-            <a:extLst>
-              <a:ext uri="{FF2B5EF4-FFF2-40B4-BE49-F238E27FC236}">
-                <a16:creationId xmlns:a16="http://schemas.microsoft.com/office/drawing/2014/main" id="{F56FF53C-2B40-5856-2A36-D5A36F56C1BA}"/>
-              </a:ext>
-            </a:extLst>
-          </p:cNvPr>
-          <p:cNvSpPr txBox="1"/>
-          <p:nvPr/>
-        </p:nvSpPr>
-        <p:spPr>
-          <a:xfrm>
-            <a:off x="8374601" y="4860907"/>
-            <a:ext cx="3201851" cy="2031325"/>
-          </a:xfrm>
-          <a:prstGeom prst="rect">
-            <a:avLst/>
-          </a:prstGeom>
-          <a:noFill/>
-        </p:spPr>
-        <p:txBody>
-          <a:bodyPr wrap="square" rtlCol="0">
-            <a:spAutoFit/>
-          </a:bodyPr>
-          <a:lstStyle/>
-          <a:p>
-            <a:pPr marL="285750" indent="-182880">
-              <a:buFont typeface="Arial" panose="020B0604020202020204" pitchFamily="34" charset="0"/>
-              <a:buChar char="•"/>
-            </a:pPr>
-            <a:r>
-              <a:rPr lang="en-US" sz="1400" dirty="0"/>
-              <a:t>Verifier does more than verification</a:t>
-            </a:r>
-          </a:p>
-          <a:p>
-            <a:pPr marL="548640" lvl="1" indent="-182880">
-              <a:buFont typeface="Arial" panose="020B0604020202020204" pitchFamily="34" charset="0"/>
-              <a:buChar char="•"/>
-            </a:pPr>
-            <a:r>
-              <a:rPr lang="en-US" sz="1400" dirty="0"/>
-              <a:t>Code rewrites for maps and kernel structs</a:t>
-            </a:r>
-          </a:p>
-          <a:p>
-            <a:pPr marL="285750" indent="-182880">
-              <a:buFont typeface="Arial" panose="020B0604020202020204" pitchFamily="34" charset="0"/>
-              <a:buChar char="•"/>
-            </a:pPr>
-            <a:r>
-              <a:rPr lang="en-US" sz="1400" dirty="0"/>
-              <a:t>How to transition maps from guest to host?</a:t>
-            </a:r>
-          </a:p>
-          <a:p>
-            <a:pPr marL="285750" indent="-182880">
-              <a:buFont typeface="Arial" panose="020B0604020202020204" pitchFamily="34" charset="0"/>
-              <a:buChar char="•"/>
-            </a:pPr>
-            <a:r>
-              <a:rPr lang="en-US" sz="1400" dirty="0"/>
-              <a:t>Supporting multiple programs?</a:t>
-            </a:r>
-          </a:p>
-          <a:p>
-            <a:pPr marL="285750" indent="-182880">
-              <a:buFont typeface="Arial" panose="020B0604020202020204" pitchFamily="34" charset="0"/>
-              <a:buChar char="•"/>
-            </a:pPr>
-            <a:r>
-              <a:rPr lang="en-US" sz="1400" dirty="0"/>
-              <a:t>Host and guest </a:t>
-            </a:r>
-            <a:r>
-              <a:rPr lang="en-US" sz="1400" dirty="0" err="1"/>
-              <a:t>Kconfig</a:t>
-            </a:r>
-            <a:r>
-              <a:rPr lang="en-US" sz="1400" dirty="0"/>
-              <a:t> differences?</a:t>
-            </a:r>
-          </a:p>
-          <a:p>
-            <a:pPr marL="285750" indent="-182880">
-              <a:buFont typeface="Arial" panose="020B0604020202020204" pitchFamily="34" charset="0"/>
-              <a:buChar char="•"/>
-            </a:pPr>
-            <a:r>
-              <a:rPr lang="en-US" sz="1400" dirty="0"/>
-              <a:t>Kernel version differences?</a:t>
-            </a:r>
           </a:p>
           <a:p>
             <a:pPr marL="285750" indent="-285750">
@@ -3883,58 +3794,6 @@
       </p:sp>
       <p:sp>
         <p:nvSpPr>
-          <p:cNvPr id="17" name="Rectangle 16">
-            <a:extLst>
-              <a:ext uri="{FF2B5EF4-FFF2-40B4-BE49-F238E27FC236}">
-                <a16:creationId xmlns:a16="http://schemas.microsoft.com/office/drawing/2014/main" id="{81524250-EF20-1229-70A5-5EED2A68AFED}"/>
-              </a:ext>
-            </a:extLst>
-          </p:cNvPr>
-          <p:cNvSpPr/>
-          <p:nvPr/>
-        </p:nvSpPr>
-        <p:spPr>
-          <a:xfrm>
-            <a:off x="8374600" y="4484464"/>
-            <a:ext cx="3201851" cy="376443"/>
-          </a:xfrm>
-          <a:prstGeom prst="rect">
-            <a:avLst/>
-          </a:prstGeom>
-          <a:solidFill>
-            <a:srgbClr val="861F41"/>
-          </a:solidFill>
-        </p:spPr>
-        <p:style>
-          <a:lnRef idx="2">
-            <a:schemeClr val="accent1">
-              <a:shade val="50000"/>
-            </a:schemeClr>
-          </a:lnRef>
-          <a:fillRef idx="1">
-            <a:schemeClr val="accent1"/>
-          </a:fillRef>
-          <a:effectRef idx="0">
-            <a:schemeClr val="accent1"/>
-          </a:effectRef>
-          <a:fontRef idx="minor">
-            <a:schemeClr val="lt1"/>
-          </a:fontRef>
-        </p:style>
-        <p:txBody>
-          <a:bodyPr rtlCol="0" anchor="ctr"/>
-          <a:lstStyle/>
-          <a:p>
-            <a:pPr algn="ctr"/>
-            <a:r>
-              <a:rPr lang="en-US" dirty="0"/>
-              <a:t>Challenges</a:t>
-            </a:r>
-          </a:p>
-        </p:txBody>
-      </p:sp>
-      <p:sp>
-        <p:nvSpPr>
           <p:cNvPr id="20" name="Rectangle 19">
             <a:extLst>
               <a:ext uri="{FF2B5EF4-FFF2-40B4-BE49-F238E27FC236}">
@@ -3985,81 +3844,21 @@
           </a:p>
         </p:txBody>
       </p:sp>
-      <p:pic>
-        <p:nvPicPr>
-          <p:cNvPr id="28" name="Picture 27">
-            <a:extLst>
-              <a:ext uri="{FF2B5EF4-FFF2-40B4-BE49-F238E27FC236}">
-                <a16:creationId xmlns:a16="http://schemas.microsoft.com/office/drawing/2014/main" id="{1C494854-0780-F956-B6FF-8CAF938A5B75}"/>
-              </a:ext>
-            </a:extLst>
-          </p:cNvPr>
-          <p:cNvPicPr>
-            <a:picLocks noChangeAspect="1"/>
-          </p:cNvPicPr>
+      <p:sp>
+        <p:nvSpPr>
+          <p:cNvPr id="33" name="Rectangle 32">
+            <a:extLst>
+              <a:ext uri="{FF2B5EF4-FFF2-40B4-BE49-F238E27FC236}">
+                <a16:creationId xmlns:a16="http://schemas.microsoft.com/office/drawing/2014/main" id="{5E4B7405-3733-F411-3B7B-20A414DB94CF}"/>
+              </a:ext>
+            </a:extLst>
+          </p:cNvPr>
+          <p:cNvSpPr/>
           <p:nvPr/>
-        </p:nvPicPr>
-        <p:blipFill>
-          <a:blip r:embed="rId2"/>
-          <a:stretch>
-            <a:fillRect/>
-          </a:stretch>
-        </p:blipFill>
+        </p:nvSpPr>
         <p:spPr>
           <a:xfrm>
-            <a:off x="601765" y="3587378"/>
-            <a:ext cx="3206443" cy="1844163"/>
-          </a:xfrm>
-          <a:prstGeom prst="rect">
-            <a:avLst/>
-          </a:prstGeom>
-        </p:spPr>
-      </p:pic>
-      <p:pic>
-        <p:nvPicPr>
-          <p:cNvPr id="32" name="Picture 31">
-            <a:extLst>
-              <a:ext uri="{FF2B5EF4-FFF2-40B4-BE49-F238E27FC236}">
-                <a16:creationId xmlns:a16="http://schemas.microsoft.com/office/drawing/2014/main" id="{CF96295C-6FBB-9F23-34F8-7F5C9AAF5E40}"/>
-              </a:ext>
-            </a:extLst>
-          </p:cNvPr>
-          <p:cNvPicPr>
-            <a:picLocks noChangeAspect="1"/>
-          </p:cNvPicPr>
-          <p:nvPr/>
-        </p:nvPicPr>
-        <p:blipFill>
-          <a:blip r:embed="rId3"/>
-          <a:stretch>
-            <a:fillRect/>
-          </a:stretch>
-        </p:blipFill>
-        <p:spPr>
-          <a:xfrm>
-            <a:off x="4495073" y="5130021"/>
-            <a:ext cx="3201851" cy="1493099"/>
-          </a:xfrm>
-          <a:prstGeom prst="rect">
-            <a:avLst/>
-          </a:prstGeom>
-        </p:spPr>
-      </p:pic>
-      <p:sp>
-        <p:nvSpPr>
-          <p:cNvPr id="33" name="Rectangle 32">
-            <a:extLst>
-              <a:ext uri="{FF2B5EF4-FFF2-40B4-BE49-F238E27FC236}">
-                <a16:creationId xmlns:a16="http://schemas.microsoft.com/office/drawing/2014/main" id="{5E4B7405-3733-F411-3B7B-20A414DB94CF}"/>
-              </a:ext>
-            </a:extLst>
-          </p:cNvPr>
-          <p:cNvSpPr/>
-          <p:nvPr/>
-        </p:nvSpPr>
-        <p:spPr>
-          <a:xfrm>
-            <a:off x="8374599" y="1372811"/>
+            <a:off x="8374600" y="2269123"/>
             <a:ext cx="3201851" cy="376443"/>
           </a:xfrm>
           <a:prstGeom prst="rect">
@@ -4111,7 +3910,7 @@
         </p:nvSpPr>
         <p:spPr>
           <a:xfrm>
-            <a:off x="8370007" y="1859604"/>
+            <a:off x="8370007" y="2641360"/>
             <a:ext cx="3201852" cy="2031325"/>
           </a:xfrm>
           <a:prstGeom prst="rect">
@@ -4198,7 +3997,7 @@
           <p:nvPr/>
         </p:nvPicPr>
         <p:blipFill>
-          <a:blip r:embed="rId4">
+          <a:blip r:embed="rId2">
             <a:extLst>
               <a:ext uri="{28A0092B-C50C-407E-A947-70E740481C1C}">
                 <a14:useLocalDpi xmlns:a14="http://schemas.microsoft.com/office/drawing/2010/main" val="0"/>
@@ -4234,7 +4033,7 @@
           <p:nvPr/>
         </p:nvPicPr>
         <p:blipFill>
-          <a:blip r:embed="rId5">
+          <a:blip r:embed="rId3">
             <a:extLst>
               <a:ext uri="{28A0092B-C50C-407E-A947-70E740481C1C}">
                 <a14:useLocalDpi xmlns:a14="http://schemas.microsoft.com/office/drawing/2010/main" val="0"/>
@@ -4314,6 +4113,145 @@
           </a:p>
         </p:txBody>
       </p:sp>
+      <p:sp>
+        <p:nvSpPr>
+          <p:cNvPr id="2" name="TextBox 1">
+            <a:extLst>
+              <a:ext uri="{FF2B5EF4-FFF2-40B4-BE49-F238E27FC236}">
+                <a16:creationId xmlns:a16="http://schemas.microsoft.com/office/drawing/2014/main" id="{72EDAF17-ED6B-50BB-2318-448A970CE9AF}"/>
+              </a:ext>
+            </a:extLst>
+          </p:cNvPr>
+          <p:cNvSpPr txBox="1"/>
+          <p:nvPr/>
+        </p:nvSpPr>
+        <p:spPr>
+          <a:xfrm>
+            <a:off x="8365415" y="1379681"/>
+            <a:ext cx="3201852" cy="738664"/>
+          </a:xfrm>
+          <a:prstGeom prst="rect">
+            <a:avLst/>
+          </a:prstGeom>
+          <a:noFill/>
+        </p:spPr>
+        <p:txBody>
+          <a:bodyPr wrap="square" rtlCol="0">
+            <a:spAutoFit/>
+          </a:bodyPr>
+          <a:lstStyle/>
+          <a:p>
+            <a:pPr marL="285750" indent="-194310">
+              <a:buFont typeface="Arial" panose="020B0604020202020204" pitchFamily="34" charset="0"/>
+              <a:buChar char="•"/>
+            </a:pPr>
+            <a:r>
+              <a:rPr lang="en-US" sz="1400" dirty="0"/>
+              <a:t>Design allows for offloading verification to a separate machine</a:t>
+            </a:r>
+          </a:p>
+          <a:p>
+            <a:pPr marL="560070" lvl="1" indent="-194310">
+              <a:buFont typeface="Arial" panose="020B0604020202020204" pitchFamily="34" charset="0"/>
+              <a:buChar char="•"/>
+            </a:pPr>
+            <a:r>
+              <a:rPr lang="en-US" sz="1400" dirty="0"/>
+              <a:t>Embedded devices</a:t>
+            </a:r>
+          </a:p>
+        </p:txBody>
+      </p:sp>
+      <p:pic>
+        <p:nvPicPr>
+          <p:cNvPr id="3" name="Picture 2">
+            <a:extLst>
+              <a:ext uri="{FF2B5EF4-FFF2-40B4-BE49-F238E27FC236}">
+                <a16:creationId xmlns:a16="http://schemas.microsoft.com/office/drawing/2014/main" id="{0B7947F7-D146-0983-6C8D-89B0BD0DE401}"/>
+              </a:ext>
+            </a:extLst>
+          </p:cNvPr>
+          <p:cNvPicPr>
+            <a:picLocks noChangeAspect="1"/>
+          </p:cNvPicPr>
+          <p:nvPr/>
+        </p:nvPicPr>
+        <p:blipFill>
+          <a:blip r:embed="rId4"/>
+          <a:stretch>
+            <a:fillRect/>
+          </a:stretch>
+        </p:blipFill>
+        <p:spPr>
+          <a:xfrm>
+            <a:off x="8383793" y="5688138"/>
+            <a:ext cx="3201850" cy="961225"/>
+          </a:xfrm>
+          <a:prstGeom prst="rect">
+            <a:avLst/>
+          </a:prstGeom>
+        </p:spPr>
+      </p:pic>
+      <p:pic>
+        <p:nvPicPr>
+          <p:cNvPr id="6" name="Picture 5">
+            <a:extLst>
+              <a:ext uri="{FF2B5EF4-FFF2-40B4-BE49-F238E27FC236}">
+                <a16:creationId xmlns:a16="http://schemas.microsoft.com/office/drawing/2014/main" id="{CFE3C47E-9DA5-F311-DC28-02ADBE1F1797}"/>
+              </a:ext>
+            </a:extLst>
+          </p:cNvPr>
+          <p:cNvPicPr>
+            <a:picLocks noChangeAspect="1"/>
+          </p:cNvPicPr>
+          <p:nvPr/>
+        </p:nvPicPr>
+        <p:blipFill>
+          <a:blip r:embed="rId5"/>
+          <a:stretch>
+            <a:fillRect/>
+          </a:stretch>
+        </p:blipFill>
+        <p:spPr>
+          <a:xfrm>
+            <a:off x="4485885" y="5076832"/>
+            <a:ext cx="3201850" cy="1572531"/>
+          </a:xfrm>
+          <a:prstGeom prst="rect">
+            <a:avLst/>
+          </a:prstGeom>
+        </p:spPr>
+      </p:pic>
+      <p:pic>
+        <p:nvPicPr>
+          <p:cNvPr id="9" name="Picture 8">
+            <a:extLst>
+              <a:ext uri="{FF2B5EF4-FFF2-40B4-BE49-F238E27FC236}">
+                <a16:creationId xmlns:a16="http://schemas.microsoft.com/office/drawing/2014/main" id="{6076A39C-A673-6A23-D78D-0FD57C64D37E}"/>
+              </a:ext>
+            </a:extLst>
+          </p:cNvPr>
+          <p:cNvPicPr>
+            <a:picLocks noChangeAspect="1"/>
+          </p:cNvPicPr>
+          <p:nvPr/>
+        </p:nvPicPr>
+        <p:blipFill>
+          <a:blip r:embed="rId6"/>
+          <a:stretch>
+            <a:fillRect/>
+          </a:stretch>
+        </p:blipFill>
+        <p:spPr>
+          <a:xfrm>
+            <a:off x="615544" y="4135945"/>
+            <a:ext cx="3197256" cy="1210996"/>
+          </a:xfrm>
+          <a:prstGeom prst="rect">
+            <a:avLst/>
+          </a:prstGeom>
+        </p:spPr>
+      </p:pic>
     </p:spTree>
     <p:extLst>
       <p:ext uri="{BB962C8B-B14F-4D97-AF65-F5344CB8AC3E}">
@@ -4808,18 +4746,18 @@
 </file>
 
 <file path=customXml/item2.xml><?xml version="1.0" encoding="utf-8"?>
+<p:properties xmlns:p="http://schemas.microsoft.com/office/2006/metadata/properties" xmlns:xsi="http://www.w3.org/2001/XMLSchema-instance" xmlns:pc="http://schemas.microsoft.com/office/infopath/2007/PartnerControls">
+  <documentManagement/>
+</p:properties>
+</file>
+
+<file path=customXml/item3.xml><?xml version="1.0" encoding="utf-8"?>
 <?mso-contentType ?>
 <FormTemplates xmlns="http://schemas.microsoft.com/sharepoint/v3/contenttype/forms">
   <Display>DocumentLibraryForm</Display>
   <Edit>DocumentLibraryForm</Edit>
   <New>DocumentLibraryForm</New>
 </FormTemplates>
-</file>
-
-<file path=customXml/item3.xml><?xml version="1.0" encoding="utf-8"?>
-<p:properties xmlns:p="http://schemas.microsoft.com/office/2006/metadata/properties" xmlns:xsi="http://www.w3.org/2001/XMLSchema-instance" xmlns:pc="http://schemas.microsoft.com/office/infopath/2007/PartnerControls">
-  <documentManagement/>
-</p:properties>
 </file>
 
 <file path=customXml/itemProps1.xml><?xml version="1.0" encoding="utf-8"?>
@@ -4842,14 +4780,6 @@
 </file>
 
 <file path=customXml/itemProps2.xml><?xml version="1.0" encoding="utf-8"?>
-<ds:datastoreItem xmlns:ds="http://schemas.openxmlformats.org/officeDocument/2006/customXml" ds:itemID="{B50E64AF-699E-4BC7-949A-633EBCF1A807}">
-  <ds:schemaRefs>
-    <ds:schemaRef ds:uri="http://schemas.microsoft.com/sharepoint/v3/contenttype/forms"/>
-  </ds:schemaRefs>
-</ds:datastoreItem>
-</file>
-
-<file path=customXml/itemProps3.xml><?xml version="1.0" encoding="utf-8"?>
 <ds:datastoreItem xmlns:ds="http://schemas.openxmlformats.org/officeDocument/2006/customXml" ds:itemID="{3107A8B0-0CA1-47B3-8BF6-5DB401902AFC}">
   <ds:schemaRefs>
     <ds:schemaRef ds:uri="http://www.w3.org/XML/1998/namespace"/>
@@ -4864,4 +4794,12 @@
     <ds:schemaRef ds:uri="http://purl.org/dc/terms/"/>
   </ds:schemaRefs>
 </ds:datastoreItem>
+</file>
+
+<file path=customXml/itemProps3.xml><?xml version="1.0" encoding="utf-8"?>
+<ds:datastoreItem xmlns:ds="http://schemas.openxmlformats.org/officeDocument/2006/customXml" ds:itemID="{B50E64AF-699E-4BC7-949A-633EBCF1A807}">
+  <ds:schemaRefs>
+    <ds:schemaRef ds:uri="http://schemas.microsoft.com/sharepoint/v3/contenttype/forms"/>
+  </ds:schemaRefs>
+</ds:datastoreItem>
 </file>
</xml_diff>